<commit_message>
Technical report reviewed by Boris and Sergio
</commit_message>
<xml_diff>
--- a/Documentation/Technical Report/Resources/capture_effect.pptx
+++ b/Documentation/Technical Report/Resources/capture_effect.pptx
@@ -104,6 +104,11 @@
       </a:defRPr>
     </a:lvl9pPr>
   </p:defaultTextStyle>
+  <p:extLst>
+    <p:ext uri="{EFAFB233-063F-42B5-8137-9DF3F51BA10A}">
+      <p15:sldGuideLst xmlns:p15="http://schemas.microsoft.com/office/powerpoint/2012/main"/>
+    </p:ext>
+  </p:extLst>
 </p:presentation>
 </file>
 
@@ -235,7 +240,7 @@
           <a:lstStyle/>
           <a:p>
             <a:fld id="{82E8CBC9-5896-854B-9FC9-0CA63A6D5460}" type="datetimeFigureOut">
-              <a:t>12/12/17</a:t>
+              <a:t>21/12/17</a:t>
             </a:fld>
             <a:endParaRPr lang="en-US"/>
           </a:p>
@@ -401,7 +406,7 @@
           <a:lstStyle/>
           <a:p>
             <a:fld id="{82E8CBC9-5896-854B-9FC9-0CA63A6D5460}" type="datetimeFigureOut">
-              <a:t>12/12/17</a:t>
+              <a:t>21/12/17</a:t>
             </a:fld>
             <a:endParaRPr lang="en-US"/>
           </a:p>
@@ -577,7 +582,7 @@
           <a:lstStyle/>
           <a:p>
             <a:fld id="{82E8CBC9-5896-854B-9FC9-0CA63A6D5460}" type="datetimeFigureOut">
-              <a:t>12/12/17</a:t>
+              <a:t>21/12/17</a:t>
             </a:fld>
             <a:endParaRPr lang="en-US"/>
           </a:p>
@@ -743,7 +748,7 @@
           <a:lstStyle/>
           <a:p>
             <a:fld id="{82E8CBC9-5896-854B-9FC9-0CA63A6D5460}" type="datetimeFigureOut">
-              <a:t>12/12/17</a:t>
+              <a:t>21/12/17</a:t>
             </a:fld>
             <a:endParaRPr lang="en-US"/>
           </a:p>
@@ -986,7 +991,7 @@
           <a:lstStyle/>
           <a:p>
             <a:fld id="{82E8CBC9-5896-854B-9FC9-0CA63A6D5460}" type="datetimeFigureOut">
-              <a:t>12/12/17</a:t>
+              <a:t>21/12/17</a:t>
             </a:fld>
             <a:endParaRPr lang="en-US"/>
           </a:p>
@@ -1213,7 +1218,7 @@
           <a:lstStyle/>
           <a:p>
             <a:fld id="{82E8CBC9-5896-854B-9FC9-0CA63A6D5460}" type="datetimeFigureOut">
-              <a:t>12/12/17</a:t>
+              <a:t>21/12/17</a:t>
             </a:fld>
             <a:endParaRPr lang="en-US"/>
           </a:p>
@@ -1575,7 +1580,7 @@
           <a:lstStyle/>
           <a:p>
             <a:fld id="{82E8CBC9-5896-854B-9FC9-0CA63A6D5460}" type="datetimeFigureOut">
-              <a:t>12/12/17</a:t>
+              <a:t>21/12/17</a:t>
             </a:fld>
             <a:endParaRPr lang="en-US"/>
           </a:p>
@@ -1690,7 +1695,7 @@
           <a:lstStyle/>
           <a:p>
             <a:fld id="{82E8CBC9-5896-854B-9FC9-0CA63A6D5460}" type="datetimeFigureOut">
-              <a:t>12/12/17</a:t>
+              <a:t>21/12/17</a:t>
             </a:fld>
             <a:endParaRPr lang="en-US"/>
           </a:p>
@@ -1783,7 +1788,7 @@
           <a:lstStyle/>
           <a:p>
             <a:fld id="{82E8CBC9-5896-854B-9FC9-0CA63A6D5460}" type="datetimeFigureOut">
-              <a:t>12/12/17</a:t>
+              <a:t>21/12/17</a:t>
             </a:fld>
             <a:endParaRPr lang="en-US"/>
           </a:p>
@@ -2056,7 +2061,7 @@
           <a:lstStyle/>
           <a:p>
             <a:fld id="{82E8CBC9-5896-854B-9FC9-0CA63A6D5460}" type="datetimeFigureOut">
-              <a:t>12/12/17</a:t>
+              <a:t>21/12/17</a:t>
             </a:fld>
             <a:endParaRPr lang="en-US"/>
           </a:p>
@@ -2306,7 +2311,7 @@
           <a:lstStyle/>
           <a:p>
             <a:fld id="{82E8CBC9-5896-854B-9FC9-0CA63A6D5460}" type="datetimeFigureOut">
-              <a:t>12/12/17</a:t>
+              <a:t>21/12/17</a:t>
             </a:fld>
             <a:endParaRPr lang="en-US"/>
           </a:p>
@@ -2515,7 +2520,7 @@
           </a:lstStyle>
           <a:p>
             <a:fld id="{82E8CBC9-5896-854B-9FC9-0CA63A6D5460}" type="datetimeFigureOut">
-              <a:t>12/12/17</a:t>
+              <a:t>21/12/17</a:t>
             </a:fld>
             <a:endParaRPr lang="en-US"/>
           </a:p>
@@ -3325,6 +3330,9 @@
           <a:p>
             <a:r>
               <a:rPr lang="en-US" sz="1400">
+                <a:solidFill>
+                  <a:srgbClr val="FF0000"/>
+                </a:solidFill>
                 <a:latin typeface="Times" charset="0"/>
                 <a:ea typeface="Times" charset="0"/>
                 <a:cs typeface="Times" charset="0"/>
@@ -3335,6 +3343,9 @@
           <a:p>
             <a:r>
               <a:rPr lang="en-US" sz="1400">
+                <a:solidFill>
+                  <a:srgbClr val="FF0000"/>
+                </a:solidFill>
                 <a:latin typeface="Times" charset="0"/>
                 <a:ea typeface="Times" charset="0"/>
                 <a:cs typeface="Times" charset="0"/>

</xml_diff>